<commit_message>
explained the theory behind Convolution
</commit_message>
<xml_diff>
--- a/images_playground/Convolution.pptx
+++ b/images_playground/Convolution.pptx
@@ -16,6 +16,7 @@
     <p:sldId id="264" r:id="rId10"/>
     <p:sldId id="266" r:id="rId11"/>
     <p:sldId id="265" r:id="rId12"/>
+    <p:sldId id="267" r:id="rId13"/>
   </p:sldIdLst>
   <p:sldSz cx="12192000" cy="6858000"/>
   <p:notesSz cx="6858000" cy="9144000"/>
@@ -3795,36 +3796,6 @@
           </a:graphicData>
         </a:graphic>
       </p:graphicFrame>
-      <p:pic>
-        <p:nvPicPr>
-          <p:cNvPr id="5" name="Picture 4">
-            <a:extLst>
-              <a:ext uri="{FF2B5EF4-FFF2-40B4-BE49-F238E27FC236}">
-                <a16:creationId xmlns:a16="http://schemas.microsoft.com/office/drawing/2014/main" id="{973DAA08-FC5A-4AD2-A7BE-F605A2165C73}"/>
-              </a:ext>
-            </a:extLst>
-          </p:cNvPr>
-          <p:cNvPicPr>
-            <a:picLocks noChangeAspect="1"/>
-          </p:cNvPicPr>
-          <p:nvPr/>
-        </p:nvPicPr>
-        <p:blipFill>
-          <a:blip r:embed="rId2"/>
-          <a:stretch>
-            <a:fillRect/>
-          </a:stretch>
-        </p:blipFill>
-        <p:spPr>
-          <a:xfrm>
-            <a:off x="871538" y="600075"/>
-            <a:ext cx="3043237" cy="2157568"/>
-          </a:xfrm>
-          <a:prstGeom prst="rect">
-            <a:avLst/>
-          </a:prstGeom>
-        </p:spPr>
-      </p:pic>
       <p:cxnSp>
         <p:nvCxnSpPr>
           <p:cNvPr id="7" name="Straight Arrow Connector 6">
@@ -3836,7 +3807,6 @@
           </p:cNvPr>
           <p:cNvCxnSpPr>
             <a:cxnSpLocks/>
-            <a:stCxn id="5" idx="3"/>
           </p:cNvCxnSpPr>
           <p:nvPr/>
         </p:nvCxnSpPr>
@@ -4003,7 +3973,7 @@
         <p:spPr>
           <a:xfrm>
             <a:off x="921543" y="3481828"/>
-            <a:ext cx="3552825" cy="1477328"/>
+            <a:ext cx="3552825" cy="1754326"/>
           </a:xfrm>
           <a:prstGeom prst="rect">
             <a:avLst/>
@@ -4024,7 +3994,7 @@
           <a:p>
             <a:r>
               <a:rPr lang="en-US" dirty="0"/>
-              <a:t>A white square inside a black box</a:t>
+              <a:t>A gradually lightening gray scale image</a:t>
             </a:r>
           </a:p>
           <a:p>
@@ -4178,6 +4148,36 @@
           </a:p>
         </p:txBody>
       </p:sp>
+      <p:pic>
+        <p:nvPicPr>
+          <p:cNvPr id="9" name="Picture 8">
+            <a:extLst>
+              <a:ext uri="{FF2B5EF4-FFF2-40B4-BE49-F238E27FC236}">
+                <a16:creationId xmlns:a16="http://schemas.microsoft.com/office/drawing/2014/main" id="{B4364BB8-01DB-4D9A-B87A-D4ED0F2E1DE5}"/>
+              </a:ext>
+            </a:extLst>
+          </p:cNvPr>
+          <p:cNvPicPr>
+            <a:picLocks noChangeAspect="1"/>
+          </p:cNvPicPr>
+          <p:nvPr/>
+        </p:nvPicPr>
+        <p:blipFill>
+          <a:blip r:embed="rId2"/>
+          <a:stretch>
+            <a:fillRect/>
+          </a:stretch>
+        </p:blipFill>
+        <p:spPr>
+          <a:xfrm>
+            <a:off x="1076322" y="610404"/>
+            <a:ext cx="2124076" cy="2136910"/>
+          </a:xfrm>
+          <a:prstGeom prst="rect">
+            <a:avLst/>
+          </a:prstGeom>
+        </p:spPr>
+      </p:pic>
     </p:spTree>
     <p:extLst>
       <p:ext uri="{BB962C8B-B14F-4D97-AF65-F5344CB8AC3E}">
@@ -4270,7 +4270,7 @@
           <a:p>
             <a:r>
               <a:rPr lang="en-US" b="1" dirty="0"/>
-              <a:t>Just for Fun: this is our original image on the left and convoluted one on the right(based on example pixel values</a:t>
+              <a:t>Just for Fun: this is our original image on the left and convoluted one on the right(based on example pixel values)</a:t>
             </a:r>
             <a:endParaRPr lang="en-IN" b="1" dirty="0"/>
           </a:p>
@@ -4518,10 +4518,413 @@
           </a:p>
         </p:txBody>
       </p:sp>
+      <p:sp>
+        <p:nvSpPr>
+          <p:cNvPr id="3" name="TextBox 2">
+            <a:extLst>
+              <a:ext uri="{FF2B5EF4-FFF2-40B4-BE49-F238E27FC236}">
+                <a16:creationId xmlns:a16="http://schemas.microsoft.com/office/drawing/2014/main" id="{02492FA4-FFC6-4C9D-BEC5-E37CAF127069}"/>
+              </a:ext>
+            </a:extLst>
+          </p:cNvPr>
+          <p:cNvSpPr txBox="1"/>
+          <p:nvPr/>
+        </p:nvSpPr>
+        <p:spPr>
+          <a:xfrm>
+            <a:off x="847724" y="1381125"/>
+            <a:ext cx="10210801" cy="4801314"/>
+          </a:xfrm>
+          <a:prstGeom prst="rect">
+            <a:avLst/>
+          </a:prstGeom>
+          <a:noFill/>
+        </p:spPr>
+        <p:txBody>
+          <a:bodyPr wrap="square" rtlCol="0">
+            <a:spAutoFit/>
+          </a:bodyPr>
+          <a:lstStyle/>
+          <a:p>
+            <a:pPr marL="342900" indent="-342900">
+              <a:buFont typeface="+mj-lt"/>
+              <a:buAutoNum type="arabicPeriod"/>
+            </a:pPr>
+            <a:r>
+              <a:rPr lang="en-US" dirty="0"/>
+              <a:t>Calculations of the convolutions involves a step where we flip the kernel matrix horizontally and vertically as well. This is the mathematical formula for convolution.  However we skipped this step in our example because our kernels are symmetric. Proof below.</a:t>
+            </a:r>
+          </a:p>
+          <a:p>
+            <a:pPr marL="342900" indent="-342900">
+              <a:buFont typeface="+mj-lt"/>
+              <a:buAutoNum type="arabicPeriod"/>
+            </a:pPr>
+            <a:endParaRPr lang="en-US" dirty="0"/>
+          </a:p>
+          <a:p>
+            <a:pPr marL="342900" indent="-342900">
+              <a:buFont typeface="+mj-lt"/>
+              <a:buAutoNum type="arabicPeriod"/>
+            </a:pPr>
+            <a:endParaRPr lang="en-US" dirty="0"/>
+          </a:p>
+          <a:p>
+            <a:pPr marL="342900" indent="-342900">
+              <a:buFont typeface="+mj-lt"/>
+              <a:buAutoNum type="arabicPeriod"/>
+            </a:pPr>
+            <a:endParaRPr lang="en-US" dirty="0"/>
+          </a:p>
+          <a:p>
+            <a:pPr marL="342900" indent="-342900">
+              <a:buFont typeface="+mj-lt"/>
+              <a:buAutoNum type="arabicPeriod"/>
+            </a:pPr>
+            <a:endParaRPr lang="en-US" dirty="0"/>
+          </a:p>
+          <a:p>
+            <a:pPr marL="342900" indent="-342900">
+              <a:buFont typeface="+mj-lt"/>
+              <a:buAutoNum type="arabicPeriod"/>
+            </a:pPr>
+            <a:endParaRPr lang="en-US" dirty="0"/>
+          </a:p>
+          <a:p>
+            <a:pPr marL="342900" indent="-342900">
+              <a:buFont typeface="+mj-lt"/>
+              <a:buAutoNum type="arabicPeriod"/>
+            </a:pPr>
+            <a:endParaRPr lang="en-US" dirty="0"/>
+          </a:p>
+          <a:p>
+            <a:pPr marL="342900" indent="-342900">
+              <a:buFont typeface="+mj-lt"/>
+              <a:buAutoNum type="arabicPeriod"/>
+            </a:pPr>
+            <a:r>
+              <a:rPr lang="en-US" dirty="0"/>
+              <a:t>Given an original image of dimensions (n * k). Kernel of dimension (m * m ). Padding of value (p) and slide s </a:t>
+            </a:r>
+          </a:p>
+          <a:p>
+            <a:pPr marL="342900" indent="-342900">
+              <a:buFont typeface="+mj-lt"/>
+              <a:buAutoNum type="arabicPeriod"/>
+            </a:pPr>
+            <a:endParaRPr lang="en-US" dirty="0"/>
+          </a:p>
+          <a:p>
+            <a:r>
+              <a:rPr lang="en-US" dirty="0"/>
+              <a:t>The size of the altered image would be a * b. </a:t>
+            </a:r>
+          </a:p>
+          <a:p>
+            <a:r>
+              <a:rPr lang="en-US" dirty="0"/>
+              <a:t>Where a = floor((n +2p – m)/s) + 1  and b = floor((k +2p –m)/2) + 1 </a:t>
+            </a:r>
+          </a:p>
+          <a:p>
+            <a:endParaRPr lang="en-US" dirty="0"/>
+          </a:p>
+          <a:p>
+            <a:endParaRPr lang="en-US" dirty="0"/>
+          </a:p>
+          <a:p>
+            <a:endParaRPr lang="en-IN" dirty="0"/>
+          </a:p>
+        </p:txBody>
+      </p:sp>
+      <p:pic>
+        <p:nvPicPr>
+          <p:cNvPr id="4" name="Picture 3">
+            <a:extLst>
+              <a:ext uri="{FF2B5EF4-FFF2-40B4-BE49-F238E27FC236}">
+                <a16:creationId xmlns:a16="http://schemas.microsoft.com/office/drawing/2014/main" id="{A290C982-8795-4FD9-A718-7950406BFAC4}"/>
+              </a:ext>
+            </a:extLst>
+          </p:cNvPr>
+          <p:cNvPicPr>
+            <a:picLocks noChangeAspect="1"/>
+          </p:cNvPicPr>
+          <p:nvPr/>
+        </p:nvPicPr>
+        <p:blipFill>
+          <a:blip r:embed="rId4"/>
+          <a:stretch>
+            <a:fillRect/>
+          </a:stretch>
+        </p:blipFill>
+        <p:spPr>
+          <a:xfrm>
+            <a:off x="1195387" y="2490787"/>
+            <a:ext cx="5848350" cy="1171575"/>
+          </a:xfrm>
+          <a:prstGeom prst="rect">
+            <a:avLst/>
+          </a:prstGeom>
+        </p:spPr>
+      </p:pic>
     </p:spTree>
     <p:extLst>
       <p:ext uri="{BB962C8B-B14F-4D97-AF65-F5344CB8AC3E}">
         <p14:creationId xmlns:p14="http://schemas.microsoft.com/office/powerpoint/2010/main" val="2442392680"/>
+      </p:ext>
+    </p:extLst>
+  </p:cSld>
+  <p:clrMapOvr>
+    <a:masterClrMapping/>
+  </p:clrMapOvr>
+</p:sld>
+</file>
+
+<file path=ppt/slides/slide12.xml><?xml version="1.0" encoding="utf-8"?>
+<p:sld xmlns:a="http://schemas.openxmlformats.org/drawingml/2006/main" xmlns:r="http://schemas.openxmlformats.org/officeDocument/2006/relationships" xmlns:p="http://schemas.openxmlformats.org/presentationml/2006/main">
+  <p:cSld>
+    <p:spTree>
+      <p:nvGrpSpPr>
+        <p:cNvPr id="1" name=""/>
+        <p:cNvGrpSpPr/>
+        <p:nvPr/>
+      </p:nvGrpSpPr>
+      <p:grpSpPr>
+        <a:xfrm>
+          <a:off x="0" y="0"/>
+          <a:ext cx="0" cy="0"/>
+          <a:chOff x="0" y="0"/>
+          <a:chExt cx="0" cy="0"/>
+        </a:xfrm>
+      </p:grpSpPr>
+      <p:pic>
+        <p:nvPicPr>
+          <p:cNvPr id="10" name="Picture 9">
+            <a:extLst>
+              <a:ext uri="{FF2B5EF4-FFF2-40B4-BE49-F238E27FC236}">
+                <a16:creationId xmlns:a16="http://schemas.microsoft.com/office/drawing/2014/main" id="{40D4CBF2-10E1-4FB3-A29F-8AE59698ED0B}"/>
+              </a:ext>
+            </a:extLst>
+          </p:cNvPr>
+          <p:cNvPicPr>
+            <a:picLocks noChangeAspect="1"/>
+          </p:cNvPicPr>
+          <p:nvPr/>
+        </p:nvPicPr>
+        <p:blipFill>
+          <a:blip r:embed="rId2">
+            <a:extLst>
+              <a:ext uri="{28A0092B-C50C-407E-A947-70E740481C1C}">
+                <a14:useLocalDpi xmlns:a14="http://schemas.microsoft.com/office/drawing/2010/main" val="0"/>
+              </a:ext>
+              <a:ext uri="{837473B0-CC2E-450A-ABE3-18F120FF3D39}">
+                <a1611:picAttrSrcUrl xmlns:a1611="http://schemas.microsoft.com/office/drawing/2016/11/main" r:id="rId3"/>
+              </a:ext>
+            </a:extLst>
+          </a:blip>
+          <a:stretch>
+            <a:fillRect/>
+          </a:stretch>
+        </p:blipFill>
+        <p:spPr>
+          <a:xfrm>
+            <a:off x="500062" y="271653"/>
+            <a:ext cx="695325" cy="822174"/>
+          </a:xfrm>
+          <a:prstGeom prst="rect">
+            <a:avLst/>
+          </a:prstGeom>
+        </p:spPr>
+      </p:pic>
+      <p:sp>
+        <p:nvSpPr>
+          <p:cNvPr id="2" name="TextBox 1">
+            <a:extLst>
+              <a:ext uri="{FF2B5EF4-FFF2-40B4-BE49-F238E27FC236}">
+                <a16:creationId xmlns:a16="http://schemas.microsoft.com/office/drawing/2014/main" id="{689FCCE3-8BEB-487B-8EB4-B9B2E0A228C9}"/>
+              </a:ext>
+            </a:extLst>
+          </p:cNvPr>
+          <p:cNvSpPr txBox="1"/>
+          <p:nvPr/>
+        </p:nvSpPr>
+        <p:spPr>
+          <a:xfrm>
+            <a:off x="952499" y="723901"/>
+            <a:ext cx="9515475" cy="369926"/>
+          </a:xfrm>
+          <a:prstGeom prst="rect">
+            <a:avLst/>
+          </a:prstGeom>
+          <a:noFill/>
+        </p:spPr>
+        <p:txBody>
+          <a:bodyPr wrap="square" rtlCol="0">
+            <a:spAutoFit/>
+          </a:bodyPr>
+          <a:lstStyle/>
+          <a:p>
+            <a:r>
+              <a:rPr lang="en-US" b="1" dirty="0"/>
+              <a:t>Some important theories to consider</a:t>
+            </a:r>
+            <a:endParaRPr lang="en-IN" b="1" dirty="0"/>
+          </a:p>
+        </p:txBody>
+      </p:sp>
+      <p:sp>
+        <p:nvSpPr>
+          <p:cNvPr id="3" name="TextBox 2">
+            <a:extLst>
+              <a:ext uri="{FF2B5EF4-FFF2-40B4-BE49-F238E27FC236}">
+                <a16:creationId xmlns:a16="http://schemas.microsoft.com/office/drawing/2014/main" id="{02492FA4-FFC6-4C9D-BEC5-E37CAF127069}"/>
+              </a:ext>
+            </a:extLst>
+          </p:cNvPr>
+          <p:cNvSpPr txBox="1"/>
+          <p:nvPr/>
+        </p:nvSpPr>
+        <p:spPr>
+          <a:xfrm>
+            <a:off x="847724" y="1381125"/>
+            <a:ext cx="10210801" cy="1477328"/>
+          </a:xfrm>
+          <a:prstGeom prst="rect">
+            <a:avLst/>
+          </a:prstGeom>
+          <a:noFill/>
+        </p:spPr>
+        <p:txBody>
+          <a:bodyPr wrap="square" rtlCol="0">
+            <a:spAutoFit/>
+          </a:bodyPr>
+          <a:lstStyle/>
+          <a:p>
+            <a:endParaRPr lang="en-US" dirty="0"/>
+          </a:p>
+          <a:p>
+            <a:r>
+              <a:rPr lang="en-US" dirty="0"/>
+              <a:t>3. When we are performing the weighted sum, it is possible that the output exceeds the range 0-255. Python libraries would take care of this issue, by  having the max value as white and lowest values as black</a:t>
+            </a:r>
+          </a:p>
+          <a:p>
+            <a:endParaRPr lang="en-US" dirty="0"/>
+          </a:p>
+          <a:p>
+            <a:endParaRPr lang="en-IN" dirty="0"/>
+          </a:p>
+        </p:txBody>
+      </p:sp>
+      <p:pic>
+        <p:nvPicPr>
+          <p:cNvPr id="5" name="Picture 4">
+            <a:extLst>
+              <a:ext uri="{FF2B5EF4-FFF2-40B4-BE49-F238E27FC236}">
+                <a16:creationId xmlns:a16="http://schemas.microsoft.com/office/drawing/2014/main" id="{61021D0A-128C-40F5-A6FA-F36D57941566}"/>
+              </a:ext>
+            </a:extLst>
+          </p:cNvPr>
+          <p:cNvPicPr>
+            <a:picLocks noChangeAspect="1"/>
+          </p:cNvPicPr>
+          <p:nvPr/>
+        </p:nvPicPr>
+        <p:blipFill>
+          <a:blip r:embed="rId4"/>
+          <a:stretch>
+            <a:fillRect/>
+          </a:stretch>
+        </p:blipFill>
+        <p:spPr>
+          <a:xfrm>
+            <a:off x="952499" y="2466974"/>
+            <a:ext cx="5692721" cy="4000501"/>
+          </a:xfrm>
+          <a:prstGeom prst="rect">
+            <a:avLst/>
+          </a:prstGeom>
+        </p:spPr>
+      </p:pic>
+      <p:sp>
+        <p:nvSpPr>
+          <p:cNvPr id="6" name="TextBox 5">
+            <a:extLst>
+              <a:ext uri="{FF2B5EF4-FFF2-40B4-BE49-F238E27FC236}">
+                <a16:creationId xmlns:a16="http://schemas.microsoft.com/office/drawing/2014/main" id="{5B36DCBE-F7B4-4360-8F5F-6EA508C96B2F}"/>
+              </a:ext>
+            </a:extLst>
+          </p:cNvPr>
+          <p:cNvSpPr txBox="1"/>
+          <p:nvPr/>
+        </p:nvSpPr>
+        <p:spPr>
+          <a:xfrm>
+            <a:off x="7029450" y="2762250"/>
+            <a:ext cx="3619500" cy="2585323"/>
+          </a:xfrm>
+          <a:prstGeom prst="rect">
+            <a:avLst/>
+          </a:prstGeom>
+          <a:noFill/>
+        </p:spPr>
+        <p:txBody>
+          <a:bodyPr wrap="square" rtlCol="0">
+            <a:spAutoFit/>
+          </a:bodyPr>
+          <a:lstStyle/>
+          <a:p>
+            <a:r>
+              <a:rPr lang="en-US" dirty="0"/>
+              <a:t>This particular matrix exceeds 0-255 range in all boxes.</a:t>
+            </a:r>
+          </a:p>
+          <a:p>
+            <a:endParaRPr lang="en-US" dirty="0"/>
+          </a:p>
+          <a:p>
+            <a:r>
+              <a:rPr lang="en-US" dirty="0"/>
+              <a:t>So , python performs the following :</a:t>
+            </a:r>
+          </a:p>
+          <a:p>
+            <a:endParaRPr lang="en-US" dirty="0"/>
+          </a:p>
+          <a:p>
+            <a:pPr marL="342900" indent="-342900">
+              <a:buAutoNum type="arabicPeriod"/>
+            </a:pPr>
+            <a:r>
+              <a:rPr lang="en-US" dirty="0"/>
+              <a:t>Largest values shown as white.</a:t>
+            </a:r>
+          </a:p>
+          <a:p>
+            <a:pPr marL="342900" indent="-342900">
+              <a:buAutoNum type="arabicPeriod"/>
+            </a:pPr>
+            <a:r>
+              <a:rPr lang="en-US" dirty="0"/>
+              <a:t>Lowest values shown as black</a:t>
+            </a:r>
+          </a:p>
+          <a:p>
+            <a:pPr marL="342900" indent="-342900">
+              <a:buAutoNum type="arabicPeriod"/>
+            </a:pPr>
+            <a:r>
+              <a:rPr lang="en-US" dirty="0"/>
+              <a:t>Values within are in ranges of gray</a:t>
+            </a:r>
+            <a:endParaRPr lang="en-IN" dirty="0"/>
+          </a:p>
+        </p:txBody>
+      </p:sp>
+    </p:spTree>
+    <p:extLst>
+      <p:ext uri="{BB962C8B-B14F-4D97-AF65-F5344CB8AC3E}">
+        <p14:creationId xmlns:p14="http://schemas.microsoft.com/office/powerpoint/2010/main" val="2894780241"/>
       </p:ext>
     </p:extLst>
   </p:cSld>
@@ -20125,6 +20528,78 @@
             <a:r>
               <a:rPr lang="en-US" dirty="0"/>
               <a:t>convolutions</a:t>
+            </a:r>
+            <a:endParaRPr lang="en-IN" dirty="0"/>
+          </a:p>
+        </p:txBody>
+      </p:sp>
+      <p:sp>
+        <p:nvSpPr>
+          <p:cNvPr id="10" name="TextBox 9">
+            <a:extLst>
+              <a:ext uri="{FF2B5EF4-FFF2-40B4-BE49-F238E27FC236}">
+                <a16:creationId xmlns:a16="http://schemas.microsoft.com/office/drawing/2014/main" id="{49AEA73A-F771-45C4-B6A7-DE8B5B64DA3E}"/>
+              </a:ext>
+            </a:extLst>
+          </p:cNvPr>
+          <p:cNvSpPr txBox="1"/>
+          <p:nvPr/>
+        </p:nvSpPr>
+        <p:spPr>
+          <a:xfrm>
+            <a:off x="792957" y="4044691"/>
+            <a:ext cx="1090204" cy="379771"/>
+          </a:xfrm>
+          <a:prstGeom prst="rect">
+            <a:avLst/>
+          </a:prstGeom>
+          <a:noFill/>
+        </p:spPr>
+        <p:txBody>
+          <a:bodyPr wrap="square" rtlCol="0">
+            <a:spAutoFit/>
+          </a:bodyPr>
+          <a:lstStyle/>
+          <a:p>
+            <a:r>
+              <a:rPr lang="en-US" dirty="0"/>
+              <a:t>Original</a:t>
+            </a:r>
+            <a:endParaRPr lang="en-IN" dirty="0"/>
+          </a:p>
+        </p:txBody>
+      </p:sp>
+      <p:sp>
+        <p:nvSpPr>
+          <p:cNvPr id="12" name="TextBox 11">
+            <a:extLst>
+              <a:ext uri="{FF2B5EF4-FFF2-40B4-BE49-F238E27FC236}">
+                <a16:creationId xmlns:a16="http://schemas.microsoft.com/office/drawing/2014/main" id="{83423D4D-76F6-4DA7-806E-0210D5BF4CB7}"/>
+              </a:ext>
+            </a:extLst>
+          </p:cNvPr>
+          <p:cNvSpPr txBox="1"/>
+          <p:nvPr/>
+        </p:nvSpPr>
+        <p:spPr>
+          <a:xfrm>
+            <a:off x="3805238" y="4036582"/>
+            <a:ext cx="1090204" cy="379771"/>
+          </a:xfrm>
+          <a:prstGeom prst="rect">
+            <a:avLst/>
+          </a:prstGeom>
+          <a:noFill/>
+        </p:spPr>
+        <p:txBody>
+          <a:bodyPr wrap="square" rtlCol="0">
+            <a:spAutoFit/>
+          </a:bodyPr>
+          <a:lstStyle/>
+          <a:p>
+            <a:r>
+              <a:rPr lang="en-US" dirty="0"/>
+              <a:t>Kernel</a:t>
             </a:r>
             <a:endParaRPr lang="en-IN" dirty="0"/>
           </a:p>

</xml_diff>

<commit_message>
corrected  aparticular spelling mistake
</commit_message>
<xml_diff>
--- a/images_playground/Convolution.pptx
+++ b/images_playground/Convolution.pptx
@@ -5946,7 +5946,15 @@
             </a:pPr>
             <a:r>
               <a:rPr lang="en-US" dirty="0"/>
-              <a:t>Given an original image of dimensions (n * k). Kernel of dimension (m * m ). Padding of value (p) and slide s </a:t>
+              <a:t>Given an original image of dimensions (n * k). Kernel of dimension (m * m ). Padding of value (p) and stride </a:t>
+            </a:r>
+            <a:r>
+              <a:rPr lang="en-US"/>
+              <a:t>of value </a:t>
+            </a:r>
+            <a:r>
+              <a:rPr lang="en-US" dirty="0"/>
+              <a:t>s </a:t>
             </a:r>
           </a:p>
           <a:p>

</xml_diff>

<commit_message>
comitting all code upto convolution
</commit_message>
<xml_diff>
--- a/images_playground/Convolution.pptx
+++ b/images_playground/Convolution.pptx
@@ -18,6 +18,7 @@
     <p:sldId id="266" r:id="rId12"/>
     <p:sldId id="265" r:id="rId13"/>
     <p:sldId id="267" r:id="rId14"/>
+    <p:sldId id="269" r:id="rId15"/>
   </p:sldIdLst>
   <p:sldSz cx="12192000" cy="6858000"/>
   <p:notesSz cx="6858000" cy="9144000"/>
@@ -273,7 +274,7 @@
           <a:p>
             <a:fld id="{5CFBC23A-4EAE-4D3F-88B0-A748C187440D}" type="datetimeFigureOut">
               <a:rPr lang="en-IN" smtClean="0"/>
-              <a:t>08-12-2018</a:t>
+              <a:t>09-12-2018</a:t>
             </a:fld>
             <a:endParaRPr lang="en-IN"/>
           </a:p>
@@ -473,7 +474,7 @@
           <a:p>
             <a:fld id="{5CFBC23A-4EAE-4D3F-88B0-A748C187440D}" type="datetimeFigureOut">
               <a:rPr lang="en-IN" smtClean="0"/>
-              <a:t>08-12-2018</a:t>
+              <a:t>09-12-2018</a:t>
             </a:fld>
             <a:endParaRPr lang="en-IN"/>
           </a:p>
@@ -683,7 +684,7 @@
           <a:p>
             <a:fld id="{5CFBC23A-4EAE-4D3F-88B0-A748C187440D}" type="datetimeFigureOut">
               <a:rPr lang="en-IN" smtClean="0"/>
-              <a:t>08-12-2018</a:t>
+              <a:t>09-12-2018</a:t>
             </a:fld>
             <a:endParaRPr lang="en-IN"/>
           </a:p>
@@ -883,7 +884,7 @@
           <a:p>
             <a:fld id="{5CFBC23A-4EAE-4D3F-88B0-A748C187440D}" type="datetimeFigureOut">
               <a:rPr lang="en-IN" smtClean="0"/>
-              <a:t>08-12-2018</a:t>
+              <a:t>09-12-2018</a:t>
             </a:fld>
             <a:endParaRPr lang="en-IN"/>
           </a:p>
@@ -1159,7 +1160,7 @@
           <a:p>
             <a:fld id="{5CFBC23A-4EAE-4D3F-88B0-A748C187440D}" type="datetimeFigureOut">
               <a:rPr lang="en-IN" smtClean="0"/>
-              <a:t>08-12-2018</a:t>
+              <a:t>09-12-2018</a:t>
             </a:fld>
             <a:endParaRPr lang="en-IN"/>
           </a:p>
@@ -1427,7 +1428,7 @@
           <a:p>
             <a:fld id="{5CFBC23A-4EAE-4D3F-88B0-A748C187440D}" type="datetimeFigureOut">
               <a:rPr lang="en-IN" smtClean="0"/>
-              <a:t>08-12-2018</a:t>
+              <a:t>09-12-2018</a:t>
             </a:fld>
             <a:endParaRPr lang="en-IN"/>
           </a:p>
@@ -1842,7 +1843,7 @@
           <a:p>
             <a:fld id="{5CFBC23A-4EAE-4D3F-88B0-A748C187440D}" type="datetimeFigureOut">
               <a:rPr lang="en-IN" smtClean="0"/>
-              <a:t>08-12-2018</a:t>
+              <a:t>09-12-2018</a:t>
             </a:fld>
             <a:endParaRPr lang="en-IN"/>
           </a:p>
@@ -1984,7 +1985,7 @@
           <a:p>
             <a:fld id="{5CFBC23A-4EAE-4D3F-88B0-A748C187440D}" type="datetimeFigureOut">
               <a:rPr lang="en-IN" smtClean="0"/>
-              <a:t>08-12-2018</a:t>
+              <a:t>09-12-2018</a:t>
             </a:fld>
             <a:endParaRPr lang="en-IN"/>
           </a:p>
@@ -2097,7 +2098,7 @@
           <a:p>
             <a:fld id="{5CFBC23A-4EAE-4D3F-88B0-A748C187440D}" type="datetimeFigureOut">
               <a:rPr lang="en-IN" smtClean="0"/>
-              <a:t>08-12-2018</a:t>
+              <a:t>09-12-2018</a:t>
             </a:fld>
             <a:endParaRPr lang="en-IN"/>
           </a:p>
@@ -2410,7 +2411,7 @@
           <a:p>
             <a:fld id="{5CFBC23A-4EAE-4D3F-88B0-A748C187440D}" type="datetimeFigureOut">
               <a:rPr lang="en-IN" smtClean="0"/>
-              <a:t>08-12-2018</a:t>
+              <a:t>09-12-2018</a:t>
             </a:fld>
             <a:endParaRPr lang="en-IN"/>
           </a:p>
@@ -2699,7 +2700,7 @@
           <a:p>
             <a:fld id="{5CFBC23A-4EAE-4D3F-88B0-A748C187440D}" type="datetimeFigureOut">
               <a:rPr lang="en-IN" smtClean="0"/>
-              <a:t>08-12-2018</a:t>
+              <a:t>09-12-2018</a:t>
             </a:fld>
             <a:endParaRPr lang="en-IN"/>
           </a:p>
@@ -2942,7 +2943,7 @@
           <a:p>
             <a:fld id="{5CFBC23A-4EAE-4D3F-88B0-A748C187440D}" type="datetimeFigureOut">
               <a:rPr lang="en-IN" smtClean="0"/>
-              <a:t>08-12-2018</a:t>
+              <a:t>09-12-2018</a:t>
             </a:fld>
             <a:endParaRPr lang="en-IN"/>
           </a:p>
@@ -6284,6 +6285,520 @@
 </p:sld>
 </file>
 
+<file path=ppt/slides/slide14.xml><?xml version="1.0" encoding="utf-8"?>
+<p:sld xmlns:a="http://schemas.openxmlformats.org/drawingml/2006/main" xmlns:r="http://schemas.openxmlformats.org/officeDocument/2006/relationships" xmlns:p="http://schemas.openxmlformats.org/presentationml/2006/main">
+  <p:cSld>
+    <p:spTree>
+      <p:nvGrpSpPr>
+        <p:cNvPr id="1" name=""/>
+        <p:cNvGrpSpPr/>
+        <p:nvPr/>
+      </p:nvGrpSpPr>
+      <p:grpSpPr>
+        <a:xfrm>
+          <a:off x="0" y="0"/>
+          <a:ext cx="0" cy="0"/>
+          <a:chOff x="0" y="0"/>
+          <a:chExt cx="0" cy="0"/>
+        </a:xfrm>
+      </p:grpSpPr>
+      <p:graphicFrame>
+        <p:nvGraphicFramePr>
+          <p:cNvPr id="4" name="Table 3">
+            <a:extLst>
+              <a:ext uri="{FF2B5EF4-FFF2-40B4-BE49-F238E27FC236}">
+                <a16:creationId xmlns:a16="http://schemas.microsoft.com/office/drawing/2014/main" id="{066F04EF-9B7E-406A-A547-CD1CEBAAAB9A}"/>
+              </a:ext>
+            </a:extLst>
+          </p:cNvPr>
+          <p:cNvGraphicFramePr>
+            <a:graphicFrameLocks noGrp="1"/>
+          </p:cNvGraphicFramePr>
+          <p:nvPr>
+            <p:extLst>
+              <p:ext uri="{D42A27DB-BD31-4B8C-83A1-F6EECF244321}">
+                <p14:modId xmlns:p14="http://schemas.microsoft.com/office/powerpoint/2010/main" val="3718886125"/>
+              </p:ext>
+            </p:extLst>
+          </p:nvPr>
+        </p:nvGraphicFramePr>
+        <p:xfrm>
+          <a:off x="476251" y="348191"/>
+          <a:ext cx="11306174" cy="6214534"/>
+        </p:xfrm>
+        <a:graphic>
+          <a:graphicData uri="http://schemas.openxmlformats.org/drawingml/2006/table">
+            <a:tbl>
+              <a:tblPr firstRow="1" bandRow="1">
+                <a:tableStyleId>{7DF18680-E054-41AD-8BC1-D1AEF772440D}</a:tableStyleId>
+              </a:tblPr>
+              <a:tblGrid>
+                <a:gridCol w="2241901">
+                  <a:extLst>
+                    <a:ext uri="{9D8B030D-6E8A-4147-A177-3AD203B41FA5}">
+                      <a16:colId xmlns:a16="http://schemas.microsoft.com/office/drawing/2014/main" val="3044299805"/>
+                    </a:ext>
+                  </a:extLst>
+                </a:gridCol>
+                <a:gridCol w="5295548">
+                  <a:extLst>
+                    <a:ext uri="{9D8B030D-6E8A-4147-A177-3AD203B41FA5}">
+                      <a16:colId xmlns:a16="http://schemas.microsoft.com/office/drawing/2014/main" val="47951699"/>
+                    </a:ext>
+                  </a:extLst>
+                </a:gridCol>
+                <a:gridCol w="3768725">
+                  <a:extLst>
+                    <a:ext uri="{9D8B030D-6E8A-4147-A177-3AD203B41FA5}">
+                      <a16:colId xmlns:a16="http://schemas.microsoft.com/office/drawing/2014/main" val="2582222409"/>
+                    </a:ext>
+                  </a:extLst>
+                </a:gridCol>
+              </a:tblGrid>
+              <a:tr h="784251">
+                <a:tc>
+                  <a:txBody>
+                    <a:bodyPr/>
+                    <a:lstStyle/>
+                    <a:p>
+                      <a:pPr algn="ctr">
+                        <a:lnSpc>
+                          <a:spcPct val="150000"/>
+                        </a:lnSpc>
+                      </a:pPr>
+                      <a:r>
+                        <a:rPr lang="en-US" dirty="0"/>
+                        <a:t>Operation</a:t>
+                      </a:r>
+                      <a:endParaRPr lang="en-IN" dirty="0"/>
+                    </a:p>
+                  </a:txBody>
+                  <a:tcPr/>
+                </a:tc>
+                <a:tc>
+                  <a:txBody>
+                    <a:bodyPr/>
+                    <a:lstStyle/>
+                    <a:p>
+                      <a:pPr algn="ctr">
+                        <a:lnSpc>
+                          <a:spcPct val="150000"/>
+                        </a:lnSpc>
+                      </a:pPr>
+                      <a:r>
+                        <a:rPr lang="en-US" dirty="0"/>
+                        <a:t>Custom Function </a:t>
+                      </a:r>
+                      <a:endParaRPr lang="en-IN" dirty="0"/>
+                    </a:p>
+                  </a:txBody>
+                  <a:tcPr/>
+                </a:tc>
+                <a:tc>
+                  <a:txBody>
+                    <a:bodyPr/>
+                    <a:lstStyle/>
+                    <a:p>
+                      <a:pPr algn="ctr">
+                        <a:lnSpc>
+                          <a:spcPct val="150000"/>
+                        </a:lnSpc>
+                      </a:pPr>
+                      <a:r>
+                        <a:rPr lang="en-US" dirty="0"/>
+                        <a:t>Industry Accepted</a:t>
+                      </a:r>
+                      <a:endParaRPr lang="en-IN" dirty="0"/>
+                    </a:p>
+                  </a:txBody>
+                  <a:tcPr/>
+                </a:tc>
+                <a:extLst>
+                  <a:ext uri="{0D108BD9-81ED-4DB2-BD59-A6C34878D82A}">
+                    <a16:rowId xmlns:a16="http://schemas.microsoft.com/office/drawing/2014/main" val="538529846"/>
+                  </a:ext>
+                </a:extLst>
+              </a:tr>
+              <a:tr h="1593235">
+                <a:tc>
+                  <a:txBody>
+                    <a:bodyPr/>
+                    <a:lstStyle/>
+                    <a:p>
+                      <a:pPr algn="ctr">
+                        <a:lnSpc>
+                          <a:spcPct val="150000"/>
+                        </a:lnSpc>
+                      </a:pPr>
+                      <a:endParaRPr lang="en-US" dirty="0"/>
+                    </a:p>
+                    <a:p>
+                      <a:pPr algn="ctr">
+                        <a:lnSpc>
+                          <a:spcPct val="150000"/>
+                        </a:lnSpc>
+                      </a:pPr>
+                      <a:r>
+                        <a:rPr lang="en-US" dirty="0"/>
+                        <a:t>F</a:t>
+                      </a:r>
+                      <a:r>
+                        <a:rPr lang="en-IN" dirty="0"/>
+                        <a:t>lip a matrix horizontally</a:t>
+                      </a:r>
+                    </a:p>
+                  </a:txBody>
+                  <a:tcPr/>
+                </a:tc>
+                <a:tc>
+                  <a:txBody>
+                    <a:bodyPr/>
+                    <a:lstStyle/>
+                    <a:p>
+                      <a:pPr algn="ctr">
+                        <a:lnSpc>
+                          <a:spcPct val="150000"/>
+                        </a:lnSpc>
+                      </a:pPr>
+                      <a:r>
+                        <a:rPr lang="en-US" dirty="0"/>
+                        <a:t>def </a:t>
+                      </a:r>
+                      <a:r>
+                        <a:rPr lang="en-US" dirty="0" err="1"/>
+                        <a:t>flip_horizontally</a:t>
+                      </a:r>
+                      <a:r>
+                        <a:rPr lang="en-US" dirty="0"/>
+                        <a:t>(matrix):</a:t>
+                      </a:r>
+                    </a:p>
+                    <a:p>
+                      <a:pPr algn="ctr">
+                        <a:lnSpc>
+                          <a:spcPct val="150000"/>
+                        </a:lnSpc>
+                      </a:pPr>
+                      <a:r>
+                        <a:rPr lang="en-US" dirty="0"/>
+                        <a:t>    return matrix[:, ::-1]</a:t>
+                      </a:r>
+                      <a:endParaRPr lang="en-IN" dirty="0"/>
+                    </a:p>
+                  </a:txBody>
+                  <a:tcPr/>
+                </a:tc>
+                <a:tc>
+                  <a:txBody>
+                    <a:bodyPr/>
+                    <a:lstStyle/>
+                    <a:p>
+                      <a:pPr algn="ctr">
+                        <a:lnSpc>
+                          <a:spcPct val="150000"/>
+                        </a:lnSpc>
+                      </a:pPr>
+                      <a:r>
+                        <a:rPr lang="en-US" dirty="0" err="1"/>
+                        <a:t>np.fliplr</a:t>
+                      </a:r>
+                      <a:r>
+                        <a:rPr lang="en-US" dirty="0"/>
+                        <a:t>()</a:t>
+                      </a:r>
+                      <a:endParaRPr lang="en-IN" dirty="0"/>
+                    </a:p>
+                  </a:txBody>
+                  <a:tcPr/>
+                </a:tc>
+                <a:extLst>
+                  <a:ext uri="{0D108BD9-81ED-4DB2-BD59-A6C34878D82A}">
+                    <a16:rowId xmlns:a16="http://schemas.microsoft.com/office/drawing/2014/main" val="2633632815"/>
+                  </a:ext>
+                </a:extLst>
+              </a:tr>
+              <a:tr h="1161254">
+                <a:tc>
+                  <a:txBody>
+                    <a:bodyPr/>
+                    <a:lstStyle/>
+                    <a:p>
+                      <a:pPr algn="ctr">
+                        <a:lnSpc>
+                          <a:spcPct val="150000"/>
+                        </a:lnSpc>
+                      </a:pPr>
+                      <a:r>
+                        <a:rPr lang="en-US" dirty="0"/>
+                        <a:t>Flip a matrix vertically</a:t>
+                      </a:r>
+                      <a:endParaRPr lang="en-IN" dirty="0"/>
+                    </a:p>
+                  </a:txBody>
+                  <a:tcPr/>
+                </a:tc>
+                <a:tc>
+                  <a:txBody>
+                    <a:bodyPr/>
+                    <a:lstStyle/>
+                    <a:p>
+                      <a:pPr algn="ctr">
+                        <a:lnSpc>
+                          <a:spcPct val="150000"/>
+                        </a:lnSpc>
+                      </a:pPr>
+                      <a:r>
+                        <a:rPr lang="en-US" dirty="0"/>
+                        <a:t>def </a:t>
+                      </a:r>
+                      <a:r>
+                        <a:rPr lang="en-US" dirty="0" err="1"/>
+                        <a:t>flip_vertically</a:t>
+                      </a:r>
+                      <a:r>
+                        <a:rPr lang="en-US" dirty="0"/>
+                        <a:t>(matrix):</a:t>
+                      </a:r>
+                    </a:p>
+                    <a:p>
+                      <a:pPr algn="ctr">
+                        <a:lnSpc>
+                          <a:spcPct val="150000"/>
+                        </a:lnSpc>
+                      </a:pPr>
+                      <a:r>
+                        <a:rPr lang="en-US" dirty="0"/>
+                        <a:t>    return matrix[::-1]</a:t>
+                      </a:r>
+                      <a:endParaRPr lang="en-IN" dirty="0"/>
+                    </a:p>
+                  </a:txBody>
+                  <a:tcPr/>
+                </a:tc>
+                <a:tc>
+                  <a:txBody>
+                    <a:bodyPr/>
+                    <a:lstStyle/>
+                    <a:p>
+                      <a:pPr algn="ctr">
+                        <a:lnSpc>
+                          <a:spcPct val="150000"/>
+                        </a:lnSpc>
+                      </a:pPr>
+                      <a:r>
+                        <a:rPr lang="en-US" dirty="0" err="1"/>
+                        <a:t>np.flipud</a:t>
+                      </a:r>
+                      <a:r>
+                        <a:rPr lang="en-US" dirty="0"/>
+                        <a:t>()</a:t>
+                      </a:r>
+                      <a:endParaRPr lang="en-IN" dirty="0"/>
+                    </a:p>
+                  </a:txBody>
+                  <a:tcPr/>
+                </a:tc>
+                <a:extLst>
+                  <a:ext uri="{0D108BD9-81ED-4DB2-BD59-A6C34878D82A}">
+                    <a16:rowId xmlns:a16="http://schemas.microsoft.com/office/drawing/2014/main" val="476701342"/>
+                  </a:ext>
+                </a:extLst>
+              </a:tr>
+              <a:tr h="1315275">
+                <a:tc>
+                  <a:txBody>
+                    <a:bodyPr/>
+                    <a:lstStyle/>
+                    <a:p>
+                      <a:pPr algn="ctr">
+                        <a:lnSpc>
+                          <a:spcPct val="200000"/>
+                        </a:lnSpc>
+                      </a:pPr>
+                      <a:r>
+                        <a:rPr lang="en-US" dirty="0"/>
+                        <a:t>Rotate a matrix</a:t>
+                      </a:r>
+                      <a:endParaRPr lang="en-IN" dirty="0"/>
+                    </a:p>
+                  </a:txBody>
+                  <a:tcPr/>
+                </a:tc>
+                <a:tc>
+                  <a:txBody>
+                    <a:bodyPr/>
+                    <a:lstStyle/>
+                    <a:p>
+                      <a:pPr algn="ctr">
+                        <a:lnSpc>
+                          <a:spcPct val="200000"/>
+                        </a:lnSpc>
+                      </a:pPr>
+                      <a:r>
+                        <a:rPr lang="en-US" dirty="0" err="1"/>
+                        <a:t>flip_vertically</a:t>
+                      </a:r>
+                      <a:r>
+                        <a:rPr lang="en-US" dirty="0"/>
+                        <a:t>(</a:t>
+                      </a:r>
+                      <a:r>
+                        <a:rPr lang="en-US" dirty="0" err="1"/>
+                        <a:t>flip_horizontally</a:t>
+                      </a:r>
+                      <a:r>
+                        <a:rPr lang="en-US" dirty="0"/>
+                        <a:t>(m))</a:t>
+                      </a:r>
+                      <a:endParaRPr lang="en-IN" dirty="0"/>
+                    </a:p>
+                  </a:txBody>
+                  <a:tcPr/>
+                </a:tc>
+                <a:tc>
+                  <a:txBody>
+                    <a:bodyPr/>
+                    <a:lstStyle/>
+                    <a:p>
+                      <a:pPr algn="ctr">
+                        <a:lnSpc>
+                          <a:spcPct val="200000"/>
+                        </a:lnSpc>
+                      </a:pPr>
+                      <a:r>
+                        <a:rPr lang="en-IN" dirty="0" err="1"/>
+                        <a:t>np.flipud</a:t>
+                      </a:r>
+                      <a:r>
+                        <a:rPr lang="en-IN" dirty="0"/>
+                        <a:t>(</a:t>
+                      </a:r>
+                      <a:r>
+                        <a:rPr lang="en-IN" dirty="0" err="1"/>
+                        <a:t>np.fliplr</a:t>
+                      </a:r>
+                      <a:r>
+                        <a:rPr lang="en-IN" dirty="0"/>
+                        <a:t>(m))</a:t>
+                      </a:r>
+                    </a:p>
+                  </a:txBody>
+                  <a:tcPr/>
+                </a:tc>
+                <a:extLst>
+                  <a:ext uri="{0D108BD9-81ED-4DB2-BD59-A6C34878D82A}">
+                    <a16:rowId xmlns:a16="http://schemas.microsoft.com/office/drawing/2014/main" val="88263924"/>
+                  </a:ext>
+                </a:extLst>
+              </a:tr>
+              <a:tr h="1360519">
+                <a:tc>
+                  <a:txBody>
+                    <a:bodyPr/>
+                    <a:lstStyle/>
+                    <a:p>
+                      <a:pPr algn="ctr">
+                        <a:lnSpc>
+                          <a:spcPct val="150000"/>
+                        </a:lnSpc>
+                      </a:pPr>
+                      <a:endParaRPr lang="en-US" dirty="0"/>
+                    </a:p>
+                    <a:p>
+                      <a:pPr algn="ctr">
+                        <a:lnSpc>
+                          <a:spcPct val="150000"/>
+                        </a:lnSpc>
+                      </a:pPr>
+                      <a:r>
+                        <a:rPr lang="en-US" dirty="0"/>
+                        <a:t>Convolution</a:t>
+                      </a:r>
+                      <a:endParaRPr lang="en-IN" dirty="0"/>
+                    </a:p>
+                  </a:txBody>
+                  <a:tcPr/>
+                </a:tc>
+                <a:tc>
+                  <a:txBody>
+                    <a:bodyPr/>
+                    <a:lstStyle/>
+                    <a:p>
+                      <a:pPr algn="ctr">
+                        <a:lnSpc>
+                          <a:spcPct val="150000"/>
+                        </a:lnSpc>
+                      </a:pPr>
+                      <a:r>
+                        <a:rPr lang="en-US" dirty="0"/>
+                        <a:t>convolution() method described above</a:t>
+                      </a:r>
+                      <a:endParaRPr lang="en-IN" dirty="0"/>
+                    </a:p>
+                  </a:txBody>
+                  <a:tcPr/>
+                </a:tc>
+                <a:tc>
+                  <a:txBody>
+                    <a:bodyPr/>
+                    <a:lstStyle/>
+                    <a:p>
+                      <a:pPr algn="ctr">
+                        <a:lnSpc>
+                          <a:spcPct val="150000"/>
+                        </a:lnSpc>
+                      </a:pPr>
+                      <a:r>
+                        <a:rPr lang="en-US" dirty="0"/>
+                        <a:t>from </a:t>
+                      </a:r>
+                      <a:r>
+                        <a:rPr lang="en-US" dirty="0" err="1"/>
+                        <a:t>scipy.signal</a:t>
+                      </a:r>
+                      <a:r>
+                        <a:rPr lang="en-US" dirty="0"/>
+                        <a:t> import convolve2d</a:t>
+                      </a:r>
+                    </a:p>
+                    <a:p>
+                      <a:pPr algn="ctr">
+                        <a:lnSpc>
+                          <a:spcPct val="150000"/>
+                        </a:lnSpc>
+                      </a:pPr>
+                      <a:r>
+                        <a:rPr lang="en-US" dirty="0"/>
+                        <a:t>convolve2d(image, kernel, mode = ‘same’)</a:t>
+                      </a:r>
+                      <a:endParaRPr lang="en-IN" dirty="0"/>
+                    </a:p>
+                  </a:txBody>
+                  <a:tcPr/>
+                </a:tc>
+                <a:extLst>
+                  <a:ext uri="{0D108BD9-81ED-4DB2-BD59-A6C34878D82A}">
+                    <a16:rowId xmlns:a16="http://schemas.microsoft.com/office/drawing/2014/main" val="2052770639"/>
+                  </a:ext>
+                </a:extLst>
+              </a:tr>
+            </a:tbl>
+          </a:graphicData>
+        </a:graphic>
+      </p:graphicFrame>
+    </p:spTree>
+    <p:extLst>
+      <p:ext uri="{BB962C8B-B14F-4D97-AF65-F5344CB8AC3E}">
+        <p14:creationId xmlns:p14="http://schemas.microsoft.com/office/powerpoint/2010/main" val="1593885717"/>
+      </p:ext>
+    </p:extLst>
+  </p:cSld>
+  <p:clrMapOvr>
+    <a:masterClrMapping/>
+  </p:clrMapOvr>
+</p:sld>
+</file>
+
 <file path=ppt/slides/slide2.xml><?xml version="1.0" encoding="utf-8"?>
 <p:sld xmlns:a="http://schemas.openxmlformats.org/drawingml/2006/main" xmlns:r="http://schemas.openxmlformats.org/officeDocument/2006/relationships" xmlns:p="http://schemas.openxmlformats.org/presentationml/2006/main">
   <p:cSld>

</xml_diff>

<commit_message>
corrected a few glitches
</commit_message>
<xml_diff>
--- a/images_playground/Convolution.pptx
+++ b/images_playground/Convolution.pptx
@@ -11626,7 +11626,7 @@
           <p:nvPr>
             <p:extLst>
               <p:ext uri="{D42A27DB-BD31-4B8C-83A1-F6EECF244321}">
-                <p14:modId xmlns:p14="http://schemas.microsoft.com/office/powerpoint/2010/main" val="3062603551"/>
+                <p14:modId xmlns:p14="http://schemas.microsoft.com/office/powerpoint/2010/main" val="993323771"/>
               </p:ext>
             </p:extLst>
           </p:nvPr>
@@ -11710,8 +11710,7 @@
                   <a:tcPr>
                     <a:solidFill>
                       <a:schemeClr val="accent2">
-                        <a:lumMod val="20000"/>
-                        <a:lumOff val="80000"/>
+                        <a:lumMod val="75000"/>
                       </a:schemeClr>
                     </a:solidFill>
                   </a:tcPr>
@@ -11768,26 +11767,41 @@
                   <a:tcPr>
                     <a:solidFill>
                       <a:schemeClr val="accent2">
-                        <a:lumMod val="75000"/>
-                      </a:schemeClr>
-                    </a:solidFill>
-                  </a:tcPr>
-                </a:tc>
-                <a:tc>
-                  <a:txBody>
-                    <a:bodyPr/>
-                    <a:lstStyle/>
-                    <a:p>
-                      <a:pPr algn="ctr">
-                        <a:lnSpc>
-                          <a:spcPct val="150000"/>
-                        </a:lnSpc>
-                      </a:pPr>
-                      <a:r>
-                        <a:rPr lang="en-US" b="1" dirty="0"/>
+                        <a:lumMod val="20000"/>
+                        <a:lumOff val="80000"/>
+                      </a:schemeClr>
+                    </a:solidFill>
+                  </a:tcPr>
+                </a:tc>
+                <a:tc>
+                  <a:txBody>
+                    <a:bodyPr/>
+                    <a:lstStyle/>
+                    <a:p>
+                      <a:pPr marL="0" algn="ctr" defTabSz="914400" rtl="0" eaLnBrk="1" latinLnBrk="0" hangingPunct="1">
+                        <a:lnSpc>
+                          <a:spcPct val="150000"/>
+                        </a:lnSpc>
+                      </a:pPr>
+                      <a:r>
+                        <a:rPr lang="en-US" sz="1800" b="1" kern="1200" dirty="0">
+                          <a:solidFill>
+                            <a:schemeClr val="dk1"/>
+                          </a:solidFill>
+                          <a:latin typeface="+mn-lt"/>
+                          <a:ea typeface="+mn-ea"/>
+                          <a:cs typeface="+mn-cs"/>
+                        </a:rPr>
                         <a:t>2</a:t>
                       </a:r>
-                      <a:endParaRPr lang="en-IN" b="1" dirty="0"/>
+                      <a:endParaRPr lang="en-IN" sz="1800" b="1" kern="1200" dirty="0">
+                        <a:solidFill>
+                          <a:schemeClr val="dk1"/>
+                        </a:solidFill>
+                        <a:latin typeface="+mn-lt"/>
+                        <a:ea typeface="+mn-ea"/>
+                        <a:cs typeface="+mn-cs"/>
+                      </a:endParaRPr>
                     </a:p>
                   </a:txBody>
                   <a:tcPr>
@@ -11819,7 +11833,8 @@
                   <a:tcPr>
                     <a:solidFill>
                       <a:schemeClr val="accent2">
-                        <a:lumMod val="75000"/>
+                        <a:lumMod val="20000"/>
+                        <a:lumOff val="80000"/>
                       </a:schemeClr>
                     </a:solidFill>
                   </a:tcPr>
@@ -11876,8 +11891,7 @@
                   <a:tcPr>
                     <a:solidFill>
                       <a:schemeClr val="accent2">
-                        <a:lumMod val="20000"/>
-                        <a:lumOff val="80000"/>
+                        <a:lumMod val="75000"/>
                       </a:schemeClr>
                     </a:solidFill>
                   </a:tcPr>
@@ -11970,7 +11984,7 @@
           <p:nvPr>
             <p:extLst>
               <p:ext uri="{D42A27DB-BD31-4B8C-83A1-F6EECF244321}">
-                <p14:modId xmlns:p14="http://schemas.microsoft.com/office/powerpoint/2010/main" val="194716313"/>
+                <p14:modId xmlns:p14="http://schemas.microsoft.com/office/powerpoint/2010/main" val="853645840"/>
               </p:ext>
             </p:extLst>
           </p:nvPr>
@@ -12054,33 +12068,33 @@
                   <a:tcPr>
                     <a:solidFill>
                       <a:schemeClr val="accent2">
+                        <a:lumMod val="75000"/>
+                      </a:schemeClr>
+                    </a:solidFill>
+                  </a:tcPr>
+                </a:tc>
+                <a:tc>
+                  <a:txBody>
+                    <a:bodyPr/>
+                    <a:lstStyle/>
+                    <a:p>
+                      <a:pPr algn="ctr">
+                        <a:lnSpc>
+                          <a:spcPct val="150000"/>
+                        </a:lnSpc>
+                      </a:pPr>
+                      <a:r>
+                        <a:rPr lang="en-US" dirty="0"/>
+                        <a:t>2</a:t>
+                      </a:r>
+                      <a:endParaRPr lang="en-IN" dirty="0"/>
+                    </a:p>
+                  </a:txBody>
+                  <a:tcPr>
+                    <a:solidFill>
+                      <a:schemeClr val="accent2">
                         <a:lumMod val="20000"/>
                         <a:lumOff val="80000"/>
-                      </a:schemeClr>
-                    </a:solidFill>
-                  </a:tcPr>
-                </a:tc>
-                <a:tc>
-                  <a:txBody>
-                    <a:bodyPr/>
-                    <a:lstStyle/>
-                    <a:p>
-                      <a:pPr algn="ctr">
-                        <a:lnSpc>
-                          <a:spcPct val="150000"/>
-                        </a:lnSpc>
-                      </a:pPr>
-                      <a:r>
-                        <a:rPr lang="en-US" dirty="0"/>
-                        <a:t>2</a:t>
-                      </a:r>
-                      <a:endParaRPr lang="en-IN" dirty="0"/>
-                    </a:p>
-                  </a:txBody>
-                  <a:tcPr>
-                    <a:solidFill>
-                      <a:schemeClr val="accent2">
-                        <a:lumMod val="75000"/>
                       </a:schemeClr>
                     </a:solidFill>
                   </a:tcPr>
@@ -12195,7 +12209,8 @@
                   <a:tcPr>
                     <a:solidFill>
                       <a:schemeClr val="accent2">
-                        <a:lumMod val="75000"/>
+                        <a:lumMod val="20000"/>
+                        <a:lumOff val="80000"/>
                       </a:schemeClr>
                     </a:solidFill>
                   </a:tcPr>
@@ -12220,8 +12235,7 @@
                   <a:tcPr>
                     <a:solidFill>
                       <a:schemeClr val="accent2">
-                        <a:lumMod val="20000"/>
-                        <a:lumOff val="80000"/>
+                        <a:lumMod val="75000"/>
                       </a:schemeClr>
                     </a:solidFill>
                   </a:tcPr>
@@ -12291,7 +12305,7 @@
           <a:p>
             <a:r>
               <a:rPr lang="en-US" b="1" dirty="0"/>
-              <a:t>Diagonal 45degree Edge</a:t>
+              <a:t>Diagonal 45° Edge</a:t>
             </a:r>
           </a:p>
           <a:p>
@@ -12314,7 +12328,7 @@
           <p:nvPr>
             <p:extLst>
               <p:ext uri="{D42A27DB-BD31-4B8C-83A1-F6EECF244321}">
-                <p14:modId xmlns:p14="http://schemas.microsoft.com/office/powerpoint/2010/main" val="3211242913"/>
+                <p14:modId xmlns:p14="http://schemas.microsoft.com/office/powerpoint/2010/main" val="2384645476"/>
               </p:ext>
             </p:extLst>
           </p:nvPr>
@@ -12373,7 +12387,8 @@
                   <a:tcPr>
                     <a:solidFill>
                       <a:schemeClr val="accent2">
-                        <a:lumMod val="75000"/>
+                        <a:lumMod val="20000"/>
+                        <a:lumOff val="80000"/>
                       </a:schemeClr>
                     </a:solidFill>
                   </a:tcPr>
@@ -12398,8 +12413,7 @@
                   <a:tcPr>
                     <a:solidFill>
                       <a:schemeClr val="accent2">
-                        <a:lumMod val="20000"/>
-                        <a:lumOff val="80000"/>
+                        <a:lumMod val="75000"/>
                       </a:schemeClr>
                     </a:solidFill>
                   </a:tcPr>
@@ -12564,33 +12578,33 @@
                   <a:tcPr>
                     <a:solidFill>
                       <a:schemeClr val="accent2">
+                        <a:lumMod val="75000"/>
+                      </a:schemeClr>
+                    </a:solidFill>
+                  </a:tcPr>
+                </a:tc>
+                <a:tc>
+                  <a:txBody>
+                    <a:bodyPr/>
+                    <a:lstStyle/>
+                    <a:p>
+                      <a:pPr algn="ctr">
+                        <a:lnSpc>
+                          <a:spcPct val="150000"/>
+                        </a:lnSpc>
+                      </a:pPr>
+                      <a:r>
+                        <a:rPr lang="en-US" b="1" dirty="0"/>
+                        <a:t>2</a:t>
+                      </a:r>
+                      <a:endParaRPr lang="en-IN" b="1" dirty="0"/>
+                    </a:p>
+                  </a:txBody>
+                  <a:tcPr>
+                    <a:solidFill>
+                      <a:schemeClr val="accent2">
                         <a:lumMod val="20000"/>
                         <a:lumOff val="80000"/>
-                      </a:schemeClr>
-                    </a:solidFill>
-                  </a:tcPr>
-                </a:tc>
-                <a:tc>
-                  <a:txBody>
-                    <a:bodyPr/>
-                    <a:lstStyle/>
-                    <a:p>
-                      <a:pPr algn="ctr">
-                        <a:lnSpc>
-                          <a:spcPct val="150000"/>
-                        </a:lnSpc>
-                      </a:pPr>
-                      <a:r>
-                        <a:rPr lang="en-US" b="1" dirty="0"/>
-                        <a:t>2</a:t>
-                      </a:r>
-                      <a:endParaRPr lang="en-IN" b="1" dirty="0"/>
-                    </a:p>
-                  </a:txBody>
-                  <a:tcPr>
-                    <a:solidFill>
-                      <a:schemeClr val="accent2">
-                        <a:lumMod val="75000"/>
                       </a:schemeClr>
                     </a:solidFill>
                   </a:tcPr>
@@ -12635,7 +12649,7 @@
           <a:p>
             <a:r>
               <a:rPr lang="en-US" b="1" dirty="0"/>
-              <a:t>Diagonal 135degree Edge</a:t>
+              <a:t>Diagonal 135° Edge</a:t>
             </a:r>
           </a:p>
           <a:p>

</xml_diff>